<commit_message>
init build script + update ppt
</commit_message>
<xml_diff>
--- a/gis/animal-health/master-course/ppt/gis-datamodel.pptx
+++ b/gis/animal-health/master-course/ppt/gis-datamodel.pptx
@@ -5,10 +5,11 @@
     <p:sldMasterId id="2147483720" r:id="rId1"/>
   </p:sldMasterIdLst>
   <p:notesMasterIdLst>
-    <p:notesMasterId r:id="rId3"/>
+    <p:notesMasterId r:id="rId4"/>
   </p:notesMasterIdLst>
   <p:sldIdLst>
     <p:sldId id="263" r:id="rId2"/>
+    <p:sldId id="264" r:id="rId3"/>
   </p:sldIdLst>
   <p:sldSz cx="9144000" cy="6858000" type="screen4x3"/>
   <p:notesSz cx="6858000" cy="9144000"/>
@@ -192,7 +193,7 @@
           <a:p>
             <a:fld id="{E1385254-52DA-4615-918E-B5E32E05281B}" type="datetimeFigureOut">
               <a:rPr lang="fr-FR" smtClean="0"/>
-              <a:t>9/26/16</a:t>
+              <a:t>9/27/16</a:t>
             </a:fld>
             <a:endParaRPr lang="fr-FR"/>
           </a:p>
@@ -544,6 +545,90 @@
 </p:notes>
 </file>
 
+<file path=ppt/notesSlides/notesSlide2.xml><?xml version="1.0" encoding="utf-8"?>
+<p:notes xmlns:a="http://schemas.openxmlformats.org/drawingml/2006/main" xmlns:r="http://schemas.openxmlformats.org/officeDocument/2006/relationships" xmlns:p="http://schemas.openxmlformats.org/presentationml/2006/main">
+  <p:cSld>
+    <p:spTree>
+      <p:nvGrpSpPr>
+        <p:cNvPr id="1" name=""/>
+        <p:cNvGrpSpPr/>
+        <p:nvPr/>
+      </p:nvGrpSpPr>
+      <p:grpSpPr>
+        <a:xfrm>
+          <a:off x="0" y="0"/>
+          <a:ext cx="0" cy="0"/>
+          <a:chOff x="0" y="0"/>
+          <a:chExt cx="0" cy="0"/>
+        </a:xfrm>
+      </p:grpSpPr>
+      <p:sp>
+        <p:nvSpPr>
+          <p:cNvPr id="2" name="Slide Image Placeholder 1"/>
+          <p:cNvSpPr>
+            <a:spLocks noGrp="1" noRot="1" noChangeAspect="1"/>
+          </p:cNvSpPr>
+          <p:nvPr>
+            <p:ph type="sldImg"/>
+          </p:nvPr>
+        </p:nvSpPr>
+        <p:spPr/>
+      </p:sp>
+      <p:sp>
+        <p:nvSpPr>
+          <p:cNvPr id="3" name="Notes Placeholder 2"/>
+          <p:cNvSpPr>
+            <a:spLocks noGrp="1"/>
+          </p:cNvSpPr>
+          <p:nvPr>
+            <p:ph type="body" idx="1"/>
+          </p:nvPr>
+        </p:nvSpPr>
+        <p:spPr/>
+        <p:txBody>
+          <a:bodyPr/>
+          <a:lstStyle/>
+          <a:p>
+            <a:endParaRPr lang="fr-FR"/>
+          </a:p>
+        </p:txBody>
+      </p:sp>
+      <p:sp>
+        <p:nvSpPr>
+          <p:cNvPr id="4" name="Slide Number Placeholder 3"/>
+          <p:cNvSpPr>
+            <a:spLocks noGrp="1"/>
+          </p:cNvSpPr>
+          <p:nvPr>
+            <p:ph type="sldNum" sz="quarter" idx="10"/>
+          </p:nvPr>
+        </p:nvSpPr>
+        <p:spPr/>
+        <p:txBody>
+          <a:bodyPr/>
+          <a:lstStyle/>
+          <a:p>
+            <a:fld id="{B3E847A0-9C2C-4878-B945-463B2F414424}" type="slidenum">
+              <a:rPr lang="fr-FR" smtClean="0"/>
+              <a:t>2</a:t>
+            </a:fld>
+            <a:endParaRPr lang="fr-FR"/>
+          </a:p>
+        </p:txBody>
+      </p:sp>
+    </p:spTree>
+    <p:extLst>
+      <p:ext uri="{BB962C8B-B14F-4D97-AF65-F5344CB8AC3E}">
+        <p14:creationId xmlns:p14="http://schemas.microsoft.com/office/powerpoint/2010/main" val="107688128"/>
+      </p:ext>
+    </p:extLst>
+  </p:cSld>
+  <p:clrMapOvr>
+    <a:masterClrMapping/>
+  </p:clrMapOvr>
+</p:notes>
+</file>
+
 <file path=ppt/slideLayouts/slideLayout1.xml><?xml version="1.0" encoding="utf-8"?>
 <p:sldLayout xmlns:a="http://schemas.openxmlformats.org/drawingml/2006/main" xmlns:r="http://schemas.openxmlformats.org/officeDocument/2006/relationships" xmlns:p="http://schemas.openxmlformats.org/presentationml/2006/main" showMasterSp="0" type="title" preserve="1">
   <p:cSld name="Title Slide">
@@ -725,7 +810,7 @@
           <a:p>
             <a:fld id="{2014E7C4-24FC-4230-AB13-A61DC0124D69}" type="datetimeFigureOut">
               <a:rPr lang="fr-FR" smtClean="0"/>
-              <a:t>9/26/16</a:t>
+              <a:t>9/27/16</a:t>
             </a:fld>
             <a:endParaRPr lang="fr-FR"/>
           </a:p>
@@ -895,7 +980,7 @@
           <a:p>
             <a:fld id="{2014E7C4-24FC-4230-AB13-A61DC0124D69}" type="datetimeFigureOut">
               <a:rPr lang="fr-FR" smtClean="0"/>
-              <a:t>9/26/16</a:t>
+              <a:t>9/27/16</a:t>
             </a:fld>
             <a:endParaRPr lang="fr-FR"/>
           </a:p>
@@ -1075,7 +1160,7 @@
           <a:p>
             <a:fld id="{2014E7C4-24FC-4230-AB13-A61DC0124D69}" type="datetimeFigureOut">
               <a:rPr lang="fr-FR" smtClean="0"/>
-              <a:t>9/26/16</a:t>
+              <a:t>9/27/16</a:t>
             </a:fld>
             <a:endParaRPr lang="fr-FR"/>
           </a:p>
@@ -1245,7 +1330,7 @@
           <a:p>
             <a:fld id="{2014E7C4-24FC-4230-AB13-A61DC0124D69}" type="datetimeFigureOut">
               <a:rPr lang="fr-FR" smtClean="0"/>
-              <a:t>9/26/16</a:t>
+              <a:t>9/27/16</a:t>
             </a:fld>
             <a:endParaRPr lang="fr-FR"/>
           </a:p>
@@ -1491,7 +1576,7 @@
           <a:p>
             <a:fld id="{2014E7C4-24FC-4230-AB13-A61DC0124D69}" type="datetimeFigureOut">
               <a:rPr lang="fr-FR" smtClean="0"/>
-              <a:t>9/26/16</a:t>
+              <a:t>9/27/16</a:t>
             </a:fld>
             <a:endParaRPr lang="fr-FR"/>
           </a:p>
@@ -1779,7 +1864,7 @@
           <a:p>
             <a:fld id="{2014E7C4-24FC-4230-AB13-A61DC0124D69}" type="datetimeFigureOut">
               <a:rPr lang="fr-FR" smtClean="0"/>
-              <a:t>9/26/16</a:t>
+              <a:t>9/27/16</a:t>
             </a:fld>
             <a:endParaRPr lang="fr-FR"/>
           </a:p>
@@ -2201,7 +2286,7 @@
           <a:p>
             <a:fld id="{2014E7C4-24FC-4230-AB13-A61DC0124D69}" type="datetimeFigureOut">
               <a:rPr lang="fr-FR" smtClean="0"/>
-              <a:t>9/26/16</a:t>
+              <a:t>9/27/16</a:t>
             </a:fld>
             <a:endParaRPr lang="fr-FR"/>
           </a:p>
@@ -2319,7 +2404,7 @@
           <a:p>
             <a:fld id="{2014E7C4-24FC-4230-AB13-A61DC0124D69}" type="datetimeFigureOut">
               <a:rPr lang="fr-FR" smtClean="0"/>
-              <a:t>9/26/16</a:t>
+              <a:t>9/27/16</a:t>
             </a:fld>
             <a:endParaRPr lang="fr-FR"/>
           </a:p>
@@ -2414,7 +2499,7 @@
           <a:p>
             <a:fld id="{2014E7C4-24FC-4230-AB13-A61DC0124D69}" type="datetimeFigureOut">
               <a:rPr lang="fr-FR" smtClean="0"/>
-              <a:t>9/26/16</a:t>
+              <a:t>9/27/16</a:t>
             </a:fld>
             <a:endParaRPr lang="fr-FR"/>
           </a:p>
@@ -2691,7 +2776,7 @@
           <a:p>
             <a:fld id="{2014E7C4-24FC-4230-AB13-A61DC0124D69}" type="datetimeFigureOut">
               <a:rPr lang="fr-FR" smtClean="0"/>
-              <a:t>9/26/16</a:t>
+              <a:t>9/27/16</a:t>
             </a:fld>
             <a:endParaRPr lang="fr-FR"/>
           </a:p>
@@ -2944,7 +3029,7 @@
           <a:p>
             <a:fld id="{2014E7C4-24FC-4230-AB13-A61DC0124D69}" type="datetimeFigureOut">
               <a:rPr lang="fr-FR" smtClean="0"/>
-              <a:t>9/26/16</a:t>
+              <a:t>9/27/16</a:t>
             </a:fld>
             <a:endParaRPr lang="fr-FR"/>
           </a:p>
@@ -3166,7 +3251,7 @@
           <a:p>
             <a:fld id="{2014E7C4-24FC-4230-AB13-A61DC0124D69}" type="datetimeFigureOut">
               <a:rPr lang="fr-FR" smtClean="0"/>
-              <a:t>9/26/16</a:t>
+              <a:t>9/27/16</a:t>
             </a:fld>
             <a:endParaRPr lang="fr-FR"/>
           </a:p>
@@ -3766,6 +3851,109 @@
     <p:extLst>
       <p:ext uri="{BB962C8B-B14F-4D97-AF65-F5344CB8AC3E}">
         <p14:creationId xmlns:p14="http://schemas.microsoft.com/office/powerpoint/2010/main" val="1587666242"/>
+      </p:ext>
+    </p:extLst>
+  </p:cSld>
+  <p:clrMapOvr>
+    <a:masterClrMapping/>
+  </p:clrMapOvr>
+  <p:timing>
+    <p:tnLst>
+      <p:par>
+        <p:cTn xmlns:p14="http://schemas.microsoft.com/office/powerpoint/2010/main" id="1" dur="indefinite" restart="never" nodeType="tmRoot"/>
+      </p:par>
+    </p:tnLst>
+  </p:timing>
+</p:sld>
+</file>
+
+<file path=ppt/slides/slide2.xml><?xml version="1.0" encoding="utf-8"?>
+<p:sld xmlns:a="http://schemas.openxmlformats.org/drawingml/2006/main" xmlns:r="http://schemas.openxmlformats.org/officeDocument/2006/relationships" xmlns:p="http://schemas.openxmlformats.org/presentationml/2006/main">
+  <p:cSld>
+    <p:bg>
+      <p:bgPr>
+        <a:solidFill>
+          <a:schemeClr val="bg1">
+            <a:alpha val="98000"/>
+          </a:schemeClr>
+        </a:solidFill>
+        <a:effectLst/>
+      </p:bgPr>
+    </p:bg>
+    <p:spTree>
+      <p:nvGrpSpPr>
+        <p:cNvPr id="1" name=""/>
+        <p:cNvGrpSpPr/>
+        <p:nvPr/>
+      </p:nvGrpSpPr>
+      <p:grpSpPr>
+        <a:xfrm>
+          <a:off x="0" y="0"/>
+          <a:ext cx="0" cy="0"/>
+          <a:chOff x="0" y="0"/>
+          <a:chExt cx="0" cy="0"/>
+        </a:xfrm>
+      </p:grpSpPr>
+      <p:sp>
+        <p:nvSpPr>
+          <p:cNvPr id="4" name="TextBox 3"/>
+          <p:cNvSpPr txBox="1"/>
+          <p:nvPr/>
+        </p:nvSpPr>
+        <p:spPr>
+          <a:xfrm>
+            <a:off x="683568" y="188640"/>
+            <a:ext cx="1416787" cy="738664"/>
+          </a:xfrm>
+          <a:prstGeom prst="rect">
+            <a:avLst/>
+          </a:prstGeom>
+          <a:noFill/>
+        </p:spPr>
+        <p:txBody>
+          <a:bodyPr wrap="none" rtlCol="0">
+            <a:spAutoFit/>
+          </a:bodyPr>
+          <a:lstStyle/>
+          <a:p>
+            <a:r>
+              <a:rPr lang="en-US" sz="4200">
+                <a:latin typeface="Futura Condensed"/>
+                <a:cs typeface="Futura Condensed"/>
+              </a:rPr>
+              <a:t>LAYERS</a:t>
+            </a:r>
+          </a:p>
+        </p:txBody>
+      </p:sp>
+      <p:pic>
+        <p:nvPicPr>
+          <p:cNvPr id="3" name="Picture 2"/>
+          <p:cNvPicPr>
+            <a:picLocks noChangeAspect="1"/>
+          </p:cNvPicPr>
+          <p:nvPr/>
+        </p:nvPicPr>
+        <p:blipFill>
+          <a:blip r:embed="rId3"/>
+          <a:stretch>
+            <a:fillRect/>
+          </a:stretch>
+        </p:blipFill>
+        <p:spPr>
+          <a:xfrm>
+            <a:off x="2298700" y="0"/>
+            <a:ext cx="4541921" cy="6858000"/>
+          </a:xfrm>
+          <a:prstGeom prst="rect">
+            <a:avLst/>
+          </a:prstGeom>
+        </p:spPr>
+      </p:pic>
+    </p:spTree>
+    <p:extLst>
+      <p:ext uri="{BB962C8B-B14F-4D97-AF65-F5344CB8AC3E}">
+        <p14:creationId xmlns:p14="http://schemas.microsoft.com/office/powerpoint/2010/main" val="3160712846"/>
       </p:ext>
     </p:extLst>
   </p:cSld>

</xml_diff>